<commit_message>
finish attack lab task3.
</commit_message>
<xml_diff>
--- a/my-solution/3-Attack-Lab/target1/stackVisual.pptx
+++ b/my-solution/3-Attack-Lab/target1/stackVisual.pptx
@@ -5,13 +5,14 @@
     <p:sldMasterId id="2147483648" r:id="rId1"/>
   </p:sldMasterIdLst>
   <p:notesMasterIdLst>
-    <p:notesMasterId r:id="rId4"/>
+    <p:notesMasterId r:id="rId5"/>
   </p:notesMasterIdLst>
   <p:handoutMasterIdLst>
-    <p:handoutMasterId r:id="rId5"/>
+    <p:handoutMasterId r:id="rId6"/>
   </p:handoutMasterIdLst>
   <p:sldIdLst>
     <p:sldId id="256" r:id="rId3"/>
+    <p:sldId id="258" r:id="rId4"/>
   </p:sldIdLst>
   <p:sldSz cx="12192000" cy="6858000"/>
   <p:notesSz cx="7103745" cy="10234295"/>
@@ -3655,14 +3656,14 @@
             <a:p>
               <a:pPr algn="ctr"/>
               <a:r>
-                <a:rPr lang="" altLang="en-US" b="1">
+                <a:rPr lang="en-US" altLang="en-US" b="1">
                   <a:solidFill>
                     <a:schemeClr val="accent5"/>
                   </a:solidFill>
                 </a:rPr>
                 <a:t>ec 68  5f 59 b9 97 fa 68</a:t>
               </a:r>
-              <a:endParaRPr lang="" altLang="en-US" b="1">
+              <a:endParaRPr lang="en-US" altLang="en-US" b="1">
                 <a:solidFill>
                   <a:schemeClr val="accent5"/>
                 </a:solidFill>
@@ -3714,14 +3715,14 @@
             <a:p>
               <a:pPr algn="ctr"/>
               <a:r>
-                <a:rPr lang="" altLang="en-US" b="1">
+                <a:rPr lang="en-US" altLang="en-US" b="1">
                   <a:solidFill>
                     <a:schemeClr val="accent5"/>
                   </a:solidFill>
                 </a:rPr>
                 <a:t>00 00 00 00 c3 00 40 17</a:t>
               </a:r>
-              <a:endParaRPr lang="" altLang="en-US" b="1">
+              <a:endParaRPr lang="en-US" altLang="en-US" b="1">
                 <a:solidFill>
                   <a:schemeClr val="accent5"/>
                 </a:solidFill>
@@ -3779,16 +3780,7 @@
                   </a:solidFill>
                   <a:sym typeface="+mn-ea"/>
                 </a:rPr>
-                <a:t>00 00 00 00</a:t>
-              </a:r>
-              <a:r>
-                <a:rPr b="1">
-                  <a:solidFill>
-                    <a:schemeClr val="accent5"/>
-                  </a:solidFill>
-                  <a:sym typeface="+mn-ea"/>
-                </a:rPr>
-                <a:t> 00 00 00 00</a:t>
+                <a:t>00 00 00 00 00 00 00 00</a:t>
               </a:r>
               <a:endParaRPr lang="en-US"/>
             </a:p>
@@ -3844,16 +3836,7 @@
                   </a:solidFill>
                   <a:sym typeface="+mn-ea"/>
                 </a:rPr>
-                <a:t>00 00 00 00</a:t>
-              </a:r>
-              <a:r>
-                <a:rPr b="1">
-                  <a:solidFill>
-                    <a:schemeClr val="accent5"/>
-                  </a:solidFill>
-                  <a:sym typeface="+mn-ea"/>
-                </a:rPr>
-                <a:t> 00 00 00 00</a:t>
+                <a:t>00 00 00 00 00 00 00 00</a:t>
               </a:r>
               <a:endParaRPr lang="en-US" b="1"/>
             </a:p>
@@ -3903,14 +3886,14 @@
             <a:p>
               <a:pPr algn="ctr"/>
               <a:r>
-                <a:rPr lang="" altLang="en-US" b="1">
+                <a:rPr lang="en-US" altLang="en-US" b="1">
                   <a:solidFill>
                     <a:schemeClr val="accent5"/>
                   </a:solidFill>
                 </a:rPr>
                 <a:t>00 00 00 00 55 61 dc 78 </a:t>
               </a:r>
-              <a:endParaRPr lang="" altLang="en-US" b="1">
+              <a:endParaRPr lang="en-US" altLang="en-US" b="1">
                 <a:solidFill>
                   <a:schemeClr val="accent5"/>
                 </a:solidFill>
@@ -3940,10 +3923,10 @@
             </a:bodyPr>
             <a:p>
               <a:r>
-                <a:rPr lang="" altLang="en-US"/>
+                <a:rPr lang="en-US" altLang="en-US"/>
                 <a:t>&lt;- rsp+8     0x5561dc80</a:t>
               </a:r>
-              <a:endParaRPr lang="" altLang="en-US"/>
+              <a:endParaRPr lang="en-US" altLang="en-US"/>
             </a:p>
           </p:txBody>
         </p:sp>
@@ -3970,21 +3953,9 @@
             <a:p>
               <a:r>
                 <a:rPr lang="en-US" altLang="en-US"/>
-                <a:t>&lt;- rsp</a:t>
+                <a:t>&lt;- rsp+16   0x5561dc88</a:t>
               </a:r>
-              <a:r>
-                <a:rPr lang="" altLang="en-US"/>
-                <a:t>+16   </a:t>
-              </a:r>
-              <a:r>
-                <a:rPr lang="en-US" altLang="en-US"/>
-                <a:t>0x5561dc</a:t>
-              </a:r>
-              <a:r>
-                <a:rPr lang="" altLang="en-US"/>
-                <a:t>88</a:t>
-              </a:r>
-              <a:endParaRPr lang="" altLang="en-US"/>
+              <a:endParaRPr lang="en-US" altLang="en-US"/>
             </a:p>
           </p:txBody>
         </p:sp>
@@ -4011,21 +3982,9 @@
             <a:p>
               <a:r>
                 <a:rPr lang="en-US" altLang="en-US"/>
-                <a:t>&lt;- rsp</a:t>
+                <a:t>&lt;- rsp+32   0x5561dc98</a:t>
               </a:r>
-              <a:r>
-                <a:rPr lang="" altLang="en-US"/>
-                <a:t>+32  </a:t>
-              </a:r>
-              <a:r>
-                <a:rPr lang="en-US" altLang="en-US"/>
-                <a:t> 0x5561dc</a:t>
-              </a:r>
-              <a:r>
-                <a:rPr lang="" altLang="en-US"/>
-                <a:t>98</a:t>
-              </a:r>
-              <a:endParaRPr lang="" altLang="en-US"/>
+              <a:endParaRPr lang="en-US" altLang="en-US"/>
             </a:p>
           </p:txBody>
         </p:sp>
@@ -4052,21 +4011,9 @@
             <a:p>
               <a:r>
                 <a:rPr lang="en-US" altLang="en-US"/>
-                <a:t>&lt;- rsp</a:t>
+                <a:t>&lt;- rsp+24   0x5561dc90</a:t>
               </a:r>
-              <a:r>
-                <a:rPr lang="" altLang="en-US"/>
-                <a:t>+24  </a:t>
-              </a:r>
-              <a:r>
-                <a:rPr lang="en-US" altLang="en-US"/>
-                <a:t> 0x5561dc</a:t>
-              </a:r>
-              <a:r>
-                <a:rPr lang="" altLang="en-US"/>
-                <a:t>90</a:t>
-              </a:r>
-              <a:endParaRPr lang="" altLang="en-US"/>
+              <a:endParaRPr lang="en-US" altLang="en-US"/>
             </a:p>
           </p:txBody>
         </p:sp>
@@ -4093,21 +4040,9 @@
             <a:p>
               <a:r>
                 <a:rPr lang="en-US" altLang="en-US"/>
-                <a:t>&lt;- rsp</a:t>
+                <a:t>&lt;- rsp+40   0x5561dca0</a:t>
               </a:r>
-              <a:r>
-                <a:rPr lang="" altLang="en-US"/>
-                <a:t>+40  </a:t>
-              </a:r>
-              <a:r>
-                <a:rPr lang="en-US" altLang="en-US"/>
-                <a:t> 0x5561dc</a:t>
-              </a:r>
-              <a:r>
-                <a:rPr lang="" altLang="en-US"/>
-                <a:t>a0</a:t>
-              </a:r>
-              <a:endParaRPr lang="" altLang="en-US"/>
+              <a:endParaRPr lang="en-US" altLang="en-US"/>
             </a:p>
           </p:txBody>
         </p:sp>
@@ -4134,15 +4069,7 @@
             <a:p>
               <a:r>
                 <a:rPr lang="en-US" altLang="en-US"/>
-                <a:t>&lt;- rsp</a:t>
-              </a:r>
-              <a:r>
-                <a:rPr lang="" altLang="en-US"/>
-                <a:t>	       </a:t>
-              </a:r>
-              <a:r>
-                <a:rPr lang="en-US" altLang="en-US"/>
-                <a:t>0x5561dc78</a:t>
+                <a:t>&lt;- rsp	       0x5561dc78</a:t>
               </a:r>
               <a:endParaRPr lang="en-US" altLang="en-US"/>
             </a:p>
@@ -4171,14 +4098,14 @@
           </a:bodyPr>
           <a:p>
             <a:r>
-              <a:rPr lang="" altLang="en-US" b="1">
+              <a:rPr lang="en-US" altLang="en-US" b="1">
                 <a:solidFill>
                   <a:srgbClr val="C00000"/>
                 </a:solidFill>
               </a:rPr>
               <a:t>getbuf()中的retq</a:t>
             </a:r>
-            <a:endParaRPr lang="" altLang="en-US" b="1">
+            <a:endParaRPr lang="en-US" altLang="en-US" b="1">
               <a:solidFill>
                 <a:srgbClr val="C00000"/>
               </a:solidFill>
@@ -4265,10 +4192,10 @@
           <a:p>
             <a:pPr algn="ctr"/>
             <a:r>
-              <a:rPr lang="" altLang="en-US"/>
+              <a:rPr lang="en-US" altLang="en-US"/>
               <a:t>touch2()</a:t>
             </a:r>
-            <a:endParaRPr lang="" altLang="en-US"/>
+            <a:endParaRPr lang="en-US" altLang="en-US"/>
           </a:p>
         </p:txBody>
       </p:sp>
@@ -4333,20 +4260,12 @@
           </a:bodyPr>
           <a:p>
             <a:r>
-              <a:rPr lang="" altLang="en-US" b="1">
+              <a:rPr lang="en-US" altLang="en-US" b="1">
                 <a:solidFill>
                   <a:srgbClr val="C00000"/>
                 </a:solidFill>
               </a:rPr>
-              <a:t>注入代码</a:t>
-            </a:r>
-            <a:r>
-              <a:rPr lang="en-US" altLang="en-US" b="1">
-                <a:solidFill>
-                  <a:srgbClr val="C00000"/>
-                </a:solidFill>
-              </a:rPr>
-              <a:t>中的retq</a:t>
+              <a:t>注入代码中的retq</a:t>
             </a:r>
             <a:endParaRPr lang="en-US" altLang="en-US" b="1">
               <a:solidFill>
@@ -4466,6 +4385,1382 @@
           </a:p>
         </p:txBody>
       </p:sp>
+      <p:sp>
+        <p:nvSpPr>
+          <p:cNvPr id="2" name="Text Box 1"/>
+          <p:cNvSpPr txBox="true"/>
+          <p:nvPr/>
+        </p:nvSpPr>
+        <p:spPr>
+          <a:xfrm>
+            <a:off x="300355" y="276225"/>
+            <a:ext cx="2336165" cy="368300"/>
+          </a:xfrm>
+          <a:prstGeom prst="rect">
+            <a:avLst/>
+          </a:prstGeom>
+          <a:noFill/>
+        </p:spPr>
+        <p:txBody>
+          <a:bodyPr wrap="square" rtlCol="0">
+            <a:spAutoFit/>
+            <a:scene3d>
+              <a:camera prst="orthographicFront"/>
+              <a:lightRig rig="threePt" dir="t"/>
+            </a:scene3d>
+          </a:bodyPr>
+          <a:p>
+            <a:r>
+              <a:rPr lang="" altLang="en-US" b="1">
+                <a:ln/>
+                <a:solidFill>
+                  <a:schemeClr val="tx1"/>
+                </a:solidFill>
+                <a:effectLst>
+                  <a:outerShdw blurRad="38100" dist="19050" dir="2700000" algn="tl" rotWithShape="0">
+                    <a:schemeClr val="dk1">
+                      <a:alpha val="40000"/>
+                    </a:schemeClr>
+                  </a:outerShdw>
+                </a:effectLst>
+              </a:rPr>
+              <a:t>Level 2</a:t>
+            </a:r>
+            <a:endParaRPr lang="" altLang="en-US" b="1">
+              <a:ln/>
+              <a:solidFill>
+                <a:schemeClr val="tx1"/>
+              </a:solidFill>
+              <a:effectLst>
+                <a:outerShdw blurRad="38100" dist="19050" dir="2700000" algn="tl" rotWithShape="0">
+                  <a:schemeClr val="dk1">
+                    <a:alpha val="40000"/>
+                  </a:schemeClr>
+                </a:outerShdw>
+              </a:effectLst>
+            </a:endParaRPr>
+          </a:p>
+        </p:txBody>
+      </p:sp>
+    </p:spTree>
+  </p:cSld>
+  <p:clrMapOvr>
+    <a:masterClrMapping/>
+  </p:clrMapOvr>
+</p:sld>
+</file>
+
+<file path=ppt/slides/slide2.xml><?xml version="1.0" encoding="utf-8"?>
+<p:sld xmlns:a="http://schemas.openxmlformats.org/drawingml/2006/main" xmlns:r="http://schemas.openxmlformats.org/officeDocument/2006/relationships" xmlns:p="http://schemas.openxmlformats.org/presentationml/2006/main">
+  <p:cSld>
+    <p:spTree>
+      <p:nvGrpSpPr>
+        <p:cNvPr id="1" name=""/>
+        <p:cNvGrpSpPr/>
+        <p:nvPr/>
+      </p:nvGrpSpPr>
+      <p:grpSpPr/>
+      <p:sp>
+        <p:nvSpPr>
+          <p:cNvPr id="4" name="Rectangle 3"/>
+          <p:cNvSpPr/>
+          <p:nvPr/>
+        </p:nvSpPr>
+        <p:spPr>
+          <a:xfrm>
+            <a:off x="3261360" y="3456305"/>
+            <a:ext cx="3446780" cy="474345"/>
+          </a:xfrm>
+          <a:prstGeom prst="rect">
+            <a:avLst/>
+          </a:prstGeom>
+          <a:solidFill>
+            <a:schemeClr val="bg1"/>
+          </a:solidFill>
+          <a:ln w="12700">
+            <a:solidFill>
+              <a:schemeClr val="tx1"/>
+            </a:solidFill>
+          </a:ln>
+        </p:spPr>
+        <p:style>
+          <a:lnRef idx="2">
+            <a:schemeClr val="accent1">
+              <a:shade val="50000"/>
+            </a:schemeClr>
+          </a:lnRef>
+          <a:fillRef idx="1">
+            <a:schemeClr val="accent1"/>
+          </a:fillRef>
+          <a:effectRef idx="0">
+            <a:schemeClr val="accent1"/>
+          </a:effectRef>
+          <a:fontRef idx="minor">
+            <a:schemeClr val="lt1"/>
+          </a:fontRef>
+        </p:style>
+        <p:txBody>
+          <a:bodyPr rtlCol="0" anchor="ctr"/>
+          <a:p>
+            <a:pPr algn="ctr"/>
+            <a:r>
+              <a:rPr b="1">
+                <a:solidFill>
+                  <a:schemeClr val="accent5"/>
+                </a:solidFill>
+                <a:sym typeface="+mn-ea"/>
+              </a:rPr>
+              <a:t>00 00 00 00</a:t>
+            </a:r>
+            <a:r>
+              <a:rPr b="1">
+                <a:solidFill>
+                  <a:schemeClr val="accent5"/>
+                </a:solidFill>
+              </a:rPr>
+              <a:t> 00 00 00 00</a:t>
+            </a:r>
+            <a:endParaRPr b="1">
+              <a:solidFill>
+                <a:schemeClr val="accent5"/>
+              </a:solidFill>
+            </a:endParaRPr>
+          </a:p>
+        </p:txBody>
+      </p:sp>
+      <p:sp>
+        <p:nvSpPr>
+          <p:cNvPr id="5" name="Rectangle 4"/>
+          <p:cNvSpPr/>
+          <p:nvPr/>
+        </p:nvSpPr>
+        <p:spPr>
+          <a:xfrm>
+            <a:off x="3261360" y="4351655"/>
+            <a:ext cx="3446780" cy="474345"/>
+          </a:xfrm>
+          <a:prstGeom prst="rect">
+            <a:avLst/>
+          </a:prstGeom>
+          <a:solidFill>
+            <a:schemeClr val="bg1"/>
+          </a:solidFill>
+          <a:ln w="12700">
+            <a:solidFill>
+              <a:schemeClr val="tx1"/>
+            </a:solidFill>
+          </a:ln>
+        </p:spPr>
+        <p:style>
+          <a:lnRef idx="2">
+            <a:schemeClr val="accent1">
+              <a:shade val="50000"/>
+            </a:schemeClr>
+          </a:lnRef>
+          <a:fillRef idx="1">
+            <a:schemeClr val="accent1"/>
+          </a:fillRef>
+          <a:effectRef idx="0">
+            <a:schemeClr val="accent1"/>
+          </a:effectRef>
+          <a:fontRef idx="minor">
+            <a:schemeClr val="lt1"/>
+          </a:fontRef>
+        </p:style>
+        <p:txBody>
+          <a:bodyPr rtlCol="0" anchor="ctr"/>
+          <a:p>
+            <a:pPr algn="ctr"/>
+            <a:r>
+              <a:rPr lang="" altLang="en-US" b="1">
+                <a:solidFill>
+                  <a:schemeClr val="accent5"/>
+                </a:solidFill>
+              </a:rPr>
+              <a:t>fa</a:t>
+            </a:r>
+            <a:r>
+              <a:rPr lang="en-US" altLang="en-US" b="1">
+                <a:solidFill>
+                  <a:schemeClr val="accent5"/>
+                </a:solidFill>
+              </a:rPr>
+              <a:t> 68  5</a:t>
+            </a:r>
+            <a:r>
+              <a:rPr lang="" altLang="en-US" b="1">
+                <a:solidFill>
+                  <a:schemeClr val="accent5"/>
+                </a:solidFill>
+              </a:rPr>
+              <a:t>f</a:t>
+            </a:r>
+            <a:r>
+              <a:rPr lang="en-US" altLang="en-US" b="1">
+                <a:solidFill>
+                  <a:schemeClr val="accent5"/>
+                </a:solidFill>
+              </a:rPr>
+              <a:t> 5</a:t>
+            </a:r>
+            <a:r>
+              <a:rPr lang="" altLang="en-US" b="1">
+                <a:solidFill>
+                  <a:schemeClr val="accent5"/>
+                </a:solidFill>
+              </a:rPr>
+              <a:t>5</a:t>
+            </a:r>
+            <a:r>
+              <a:rPr lang="en-US" altLang="en-US" b="1">
+                <a:solidFill>
+                  <a:schemeClr val="accent5"/>
+                </a:solidFill>
+              </a:rPr>
+              <a:t> </a:t>
+            </a:r>
+            <a:r>
+              <a:rPr lang="" altLang="en-US" b="1">
+                <a:solidFill>
+                  <a:schemeClr val="accent5"/>
+                </a:solidFill>
+              </a:rPr>
+              <a:t>61</a:t>
+            </a:r>
+            <a:r>
+              <a:rPr lang="en-US" altLang="en-US" b="1">
+                <a:solidFill>
+                  <a:schemeClr val="accent5"/>
+                </a:solidFill>
+              </a:rPr>
+              <a:t> </a:t>
+            </a:r>
+            <a:r>
+              <a:rPr lang="" altLang="en-US" b="1">
+                <a:solidFill>
+                  <a:schemeClr val="accent5"/>
+                </a:solidFill>
+              </a:rPr>
+              <a:t>dc</a:t>
+            </a:r>
+            <a:r>
+              <a:rPr lang="en-US" altLang="en-US" b="1">
+                <a:solidFill>
+                  <a:schemeClr val="accent5"/>
+                </a:solidFill>
+              </a:rPr>
+              <a:t> </a:t>
+            </a:r>
+            <a:r>
+              <a:rPr lang="" altLang="en-US" b="1">
+                <a:solidFill>
+                  <a:schemeClr val="accent5"/>
+                </a:solidFill>
+              </a:rPr>
+              <a:t>a8</a:t>
+            </a:r>
+            <a:r>
+              <a:rPr lang="en-US" altLang="en-US" b="1">
+                <a:solidFill>
+                  <a:schemeClr val="accent5"/>
+                </a:solidFill>
+              </a:rPr>
+              <a:t> 68</a:t>
+            </a:r>
+            <a:endParaRPr lang="en-US" altLang="en-US" b="1">
+              <a:solidFill>
+                <a:schemeClr val="accent5"/>
+              </a:solidFill>
+            </a:endParaRPr>
+          </a:p>
+        </p:txBody>
+      </p:sp>
+      <p:sp>
+        <p:nvSpPr>
+          <p:cNvPr id="6" name="Rectangle 5"/>
+          <p:cNvSpPr/>
+          <p:nvPr/>
+        </p:nvSpPr>
+        <p:spPr>
+          <a:xfrm>
+            <a:off x="3261360" y="3877310"/>
+            <a:ext cx="3446780" cy="474345"/>
+          </a:xfrm>
+          <a:prstGeom prst="rect">
+            <a:avLst/>
+          </a:prstGeom>
+          <a:solidFill>
+            <a:schemeClr val="bg1"/>
+          </a:solidFill>
+          <a:ln w="12700">
+            <a:solidFill>
+              <a:schemeClr val="tx1"/>
+            </a:solidFill>
+          </a:ln>
+        </p:spPr>
+        <p:style>
+          <a:lnRef idx="2">
+            <a:schemeClr val="accent1">
+              <a:shade val="50000"/>
+            </a:schemeClr>
+          </a:lnRef>
+          <a:fillRef idx="1">
+            <a:schemeClr val="accent1"/>
+          </a:fillRef>
+          <a:effectRef idx="0">
+            <a:schemeClr val="accent1"/>
+          </a:effectRef>
+          <a:fontRef idx="minor">
+            <a:schemeClr val="lt1"/>
+          </a:fontRef>
+        </p:style>
+        <p:txBody>
+          <a:bodyPr rtlCol="0" anchor="ctr"/>
+          <a:p>
+            <a:pPr algn="ctr"/>
+            <a:r>
+              <a:rPr lang="en-US" altLang="en-US" b="1">
+                <a:solidFill>
+                  <a:schemeClr val="accent5"/>
+                </a:solidFill>
+              </a:rPr>
+              <a:t>00 00 00 00 c3 00 40 1</a:t>
+            </a:r>
+            <a:r>
+              <a:rPr lang="" altLang="en-US" b="1">
+                <a:solidFill>
+                  <a:schemeClr val="accent5"/>
+                </a:solidFill>
+              </a:rPr>
+              <a:t>8</a:t>
+            </a:r>
+            <a:endParaRPr lang="" altLang="en-US" b="1">
+              <a:solidFill>
+                <a:schemeClr val="accent5"/>
+              </a:solidFill>
+            </a:endParaRPr>
+          </a:p>
+        </p:txBody>
+      </p:sp>
+      <p:sp>
+        <p:nvSpPr>
+          <p:cNvPr id="7" name="Rectangle 6"/>
+          <p:cNvSpPr/>
+          <p:nvPr/>
+        </p:nvSpPr>
+        <p:spPr>
+          <a:xfrm>
+            <a:off x="3261360" y="2507615"/>
+            <a:ext cx="3446780" cy="474345"/>
+          </a:xfrm>
+          <a:prstGeom prst="rect">
+            <a:avLst/>
+          </a:prstGeom>
+          <a:solidFill>
+            <a:schemeClr val="bg1"/>
+          </a:solidFill>
+          <a:ln w="12700">
+            <a:solidFill>
+              <a:schemeClr val="tx1"/>
+            </a:solidFill>
+          </a:ln>
+        </p:spPr>
+        <p:style>
+          <a:lnRef idx="2">
+            <a:schemeClr val="accent1">
+              <a:shade val="50000"/>
+            </a:schemeClr>
+          </a:lnRef>
+          <a:fillRef idx="1">
+            <a:schemeClr val="accent1"/>
+          </a:fillRef>
+          <a:effectRef idx="0">
+            <a:schemeClr val="accent1"/>
+          </a:effectRef>
+          <a:fontRef idx="minor">
+            <a:schemeClr val="lt1"/>
+          </a:fontRef>
+        </p:style>
+        <p:txBody>
+          <a:bodyPr rtlCol="0" anchor="ctr"/>
+          <a:p>
+            <a:pPr algn="ctr"/>
+            <a:r>
+              <a:rPr b="1">
+                <a:solidFill>
+                  <a:schemeClr val="accent5"/>
+                </a:solidFill>
+                <a:sym typeface="+mn-ea"/>
+              </a:rPr>
+              <a:t>00 00 00 00 00 00 00 00</a:t>
+            </a:r>
+            <a:endParaRPr lang="en-US"/>
+          </a:p>
+        </p:txBody>
+      </p:sp>
+      <p:sp>
+        <p:nvSpPr>
+          <p:cNvPr id="8" name="Rectangle 7"/>
+          <p:cNvSpPr/>
+          <p:nvPr/>
+        </p:nvSpPr>
+        <p:spPr>
+          <a:xfrm>
+            <a:off x="3261360" y="2982595"/>
+            <a:ext cx="3446780" cy="474345"/>
+          </a:xfrm>
+          <a:prstGeom prst="rect">
+            <a:avLst/>
+          </a:prstGeom>
+          <a:solidFill>
+            <a:schemeClr val="bg1"/>
+          </a:solidFill>
+          <a:ln w="12700">
+            <a:solidFill>
+              <a:schemeClr val="tx1"/>
+            </a:solidFill>
+          </a:ln>
+        </p:spPr>
+        <p:style>
+          <a:lnRef idx="2">
+            <a:schemeClr val="accent1">
+              <a:shade val="50000"/>
+            </a:schemeClr>
+          </a:lnRef>
+          <a:fillRef idx="1">
+            <a:schemeClr val="accent1"/>
+          </a:fillRef>
+          <a:effectRef idx="0">
+            <a:schemeClr val="accent1"/>
+          </a:effectRef>
+          <a:fontRef idx="minor">
+            <a:schemeClr val="lt1"/>
+          </a:fontRef>
+        </p:style>
+        <p:txBody>
+          <a:bodyPr rtlCol="0" anchor="ctr"/>
+          <a:p>
+            <a:pPr algn="ctr"/>
+            <a:r>
+              <a:rPr b="1">
+                <a:solidFill>
+                  <a:schemeClr val="accent5"/>
+                </a:solidFill>
+                <a:sym typeface="+mn-ea"/>
+              </a:rPr>
+              <a:t>00 00 00 00 00 00 00 00</a:t>
+            </a:r>
+            <a:endParaRPr lang="en-US" b="1"/>
+          </a:p>
+        </p:txBody>
+      </p:sp>
+      <p:sp>
+        <p:nvSpPr>
+          <p:cNvPr id="9" name="Rectangle 8"/>
+          <p:cNvSpPr/>
+          <p:nvPr/>
+        </p:nvSpPr>
+        <p:spPr>
+          <a:xfrm>
+            <a:off x="3261360" y="2033270"/>
+            <a:ext cx="3446780" cy="474345"/>
+          </a:xfrm>
+          <a:prstGeom prst="rect">
+            <a:avLst/>
+          </a:prstGeom>
+          <a:solidFill>
+            <a:schemeClr val="bg1"/>
+          </a:solidFill>
+          <a:ln w="12700">
+            <a:solidFill>
+              <a:schemeClr val="tx1"/>
+            </a:solidFill>
+          </a:ln>
+        </p:spPr>
+        <p:style>
+          <a:lnRef idx="2">
+            <a:schemeClr val="accent1">
+              <a:shade val="50000"/>
+            </a:schemeClr>
+          </a:lnRef>
+          <a:fillRef idx="1">
+            <a:schemeClr val="accent1"/>
+          </a:fillRef>
+          <a:effectRef idx="0">
+            <a:schemeClr val="accent1"/>
+          </a:effectRef>
+          <a:fontRef idx="minor">
+            <a:schemeClr val="lt1"/>
+          </a:fontRef>
+        </p:style>
+        <p:txBody>
+          <a:bodyPr rtlCol="0" anchor="ctr"/>
+          <a:p>
+            <a:pPr algn="ctr"/>
+            <a:r>
+              <a:rPr lang="en-US" altLang="en-US" b="1">
+                <a:solidFill>
+                  <a:schemeClr val="accent5"/>
+                </a:solidFill>
+              </a:rPr>
+              <a:t>00 00 00 00 55 61 dc 78 </a:t>
+            </a:r>
+            <a:endParaRPr lang="en-US" altLang="en-US" b="1">
+              <a:solidFill>
+                <a:schemeClr val="accent5"/>
+              </a:solidFill>
+            </a:endParaRPr>
+          </a:p>
+        </p:txBody>
+      </p:sp>
+      <p:sp>
+        <p:nvSpPr>
+          <p:cNvPr id="10" name="Text Box 9"/>
+          <p:cNvSpPr txBox="true"/>
+          <p:nvPr/>
+        </p:nvSpPr>
+        <p:spPr>
+          <a:xfrm>
+            <a:off x="7275195" y="3949065"/>
+            <a:ext cx="4211320" cy="368300"/>
+          </a:xfrm>
+          <a:prstGeom prst="rect">
+            <a:avLst/>
+          </a:prstGeom>
+          <a:noFill/>
+        </p:spPr>
+        <p:txBody>
+          <a:bodyPr wrap="square" rtlCol="0">
+            <a:spAutoFit/>
+          </a:bodyPr>
+          <a:p>
+            <a:r>
+              <a:rPr lang="en-US" altLang="en-US"/>
+              <a:t>&lt;- rsp+8     0x5561dc80</a:t>
+            </a:r>
+            <a:endParaRPr lang="en-US" altLang="en-US"/>
+          </a:p>
+        </p:txBody>
+      </p:sp>
+      <p:sp>
+        <p:nvSpPr>
+          <p:cNvPr id="11" name="Text Box 10"/>
+          <p:cNvSpPr txBox="true"/>
+          <p:nvPr/>
+        </p:nvSpPr>
+        <p:spPr>
+          <a:xfrm>
+            <a:off x="7275195" y="3509010"/>
+            <a:ext cx="4650740" cy="368300"/>
+          </a:xfrm>
+          <a:prstGeom prst="rect">
+            <a:avLst/>
+          </a:prstGeom>
+          <a:noFill/>
+        </p:spPr>
+        <p:txBody>
+          <a:bodyPr wrap="square" rtlCol="0">
+            <a:spAutoFit/>
+          </a:bodyPr>
+          <a:p>
+            <a:r>
+              <a:rPr lang="en-US" altLang="en-US"/>
+              <a:t>&lt;- rsp+16   0x5561dc88</a:t>
+            </a:r>
+            <a:endParaRPr lang="en-US" altLang="en-US"/>
+          </a:p>
+        </p:txBody>
+      </p:sp>
+      <p:sp>
+        <p:nvSpPr>
+          <p:cNvPr id="12" name="Text Box 11"/>
+          <p:cNvSpPr txBox="true"/>
+          <p:nvPr/>
+        </p:nvSpPr>
+        <p:spPr>
+          <a:xfrm>
+            <a:off x="7275195" y="2560955"/>
+            <a:ext cx="5541010" cy="368300"/>
+          </a:xfrm>
+          <a:prstGeom prst="rect">
+            <a:avLst/>
+          </a:prstGeom>
+          <a:noFill/>
+        </p:spPr>
+        <p:txBody>
+          <a:bodyPr wrap="square" rtlCol="0">
+            <a:spAutoFit/>
+          </a:bodyPr>
+          <a:p>
+            <a:r>
+              <a:rPr lang="en-US" altLang="en-US"/>
+              <a:t>&lt;- rsp+32   0x5561dc98</a:t>
+            </a:r>
+            <a:endParaRPr lang="en-US" altLang="en-US"/>
+          </a:p>
+        </p:txBody>
+      </p:sp>
+      <p:sp>
+        <p:nvSpPr>
+          <p:cNvPr id="13" name="Text Box 12"/>
+          <p:cNvSpPr txBox="true"/>
+          <p:nvPr/>
+        </p:nvSpPr>
+        <p:spPr>
+          <a:xfrm>
+            <a:off x="7275195" y="3035300"/>
+            <a:ext cx="4927600" cy="368300"/>
+          </a:xfrm>
+          <a:prstGeom prst="rect">
+            <a:avLst/>
+          </a:prstGeom>
+          <a:noFill/>
+        </p:spPr>
+        <p:txBody>
+          <a:bodyPr wrap="square" rtlCol="0">
+            <a:spAutoFit/>
+          </a:bodyPr>
+          <a:p>
+            <a:r>
+              <a:rPr lang="en-US" altLang="en-US"/>
+              <a:t>&lt;- rsp+24   0x5561dc90</a:t>
+            </a:r>
+            <a:endParaRPr lang="en-US" altLang="en-US"/>
+          </a:p>
+        </p:txBody>
+      </p:sp>
+      <p:sp>
+        <p:nvSpPr>
+          <p:cNvPr id="14" name="Text Box 13"/>
+          <p:cNvSpPr txBox="true"/>
+          <p:nvPr/>
+        </p:nvSpPr>
+        <p:spPr>
+          <a:xfrm>
+            <a:off x="7275195" y="2086610"/>
+            <a:ext cx="4071620" cy="368300"/>
+          </a:xfrm>
+          <a:prstGeom prst="rect">
+            <a:avLst/>
+          </a:prstGeom>
+          <a:noFill/>
+        </p:spPr>
+        <p:txBody>
+          <a:bodyPr wrap="square" rtlCol="0">
+            <a:spAutoFit/>
+          </a:bodyPr>
+          <a:p>
+            <a:r>
+              <a:rPr lang="en-US" altLang="en-US"/>
+              <a:t>&lt;- rsp+40   0x5561dca0</a:t>
+            </a:r>
+            <a:endParaRPr lang="en-US" altLang="en-US"/>
+          </a:p>
+        </p:txBody>
+      </p:sp>
+      <p:sp>
+        <p:nvSpPr>
+          <p:cNvPr id="15" name="Text Box 14"/>
+          <p:cNvSpPr txBox="true"/>
+          <p:nvPr/>
+        </p:nvSpPr>
+        <p:spPr>
+          <a:xfrm>
+            <a:off x="7275195" y="4423410"/>
+            <a:ext cx="4372610" cy="368300"/>
+          </a:xfrm>
+          <a:prstGeom prst="rect">
+            <a:avLst/>
+          </a:prstGeom>
+          <a:noFill/>
+        </p:spPr>
+        <p:txBody>
+          <a:bodyPr wrap="square" rtlCol="0">
+            <a:spAutoFit/>
+          </a:bodyPr>
+          <a:p>
+            <a:r>
+              <a:rPr lang="en-US" altLang="en-US"/>
+              <a:t>&lt;- rsp	       0x5561dc78</a:t>
+            </a:r>
+            <a:endParaRPr lang="en-US" altLang="en-US"/>
+          </a:p>
+        </p:txBody>
+      </p:sp>
+      <p:sp>
+        <p:nvSpPr>
+          <p:cNvPr id="2" name="Text Box 1"/>
+          <p:cNvSpPr txBox="true"/>
+          <p:nvPr/>
+        </p:nvSpPr>
+        <p:spPr>
+          <a:xfrm>
+            <a:off x="300355" y="276225"/>
+            <a:ext cx="2336165" cy="368300"/>
+          </a:xfrm>
+          <a:prstGeom prst="rect">
+            <a:avLst/>
+          </a:prstGeom>
+          <a:noFill/>
+        </p:spPr>
+        <p:txBody>
+          <a:bodyPr wrap="square" rtlCol="0">
+            <a:spAutoFit/>
+            <a:scene3d>
+              <a:camera prst="orthographicFront"/>
+              <a:lightRig rig="threePt" dir="t"/>
+            </a:scene3d>
+          </a:bodyPr>
+          <a:p>
+            <a:r>
+              <a:rPr lang="en-US" altLang="en-US" b="1">
+                <a:solidFill>
+                  <a:schemeClr val="tx1"/>
+                </a:solidFill>
+                <a:effectLst>
+                  <a:outerShdw blurRad="38100" dist="19050" dir="2700000" algn="tl" rotWithShape="0">
+                    <a:schemeClr val="dk1">
+                      <a:alpha val="40000"/>
+                    </a:schemeClr>
+                  </a:outerShdw>
+                </a:effectLst>
+              </a:rPr>
+              <a:t>Level </a:t>
+            </a:r>
+            <a:r>
+              <a:rPr lang="" altLang="en-US" b="1">
+                <a:solidFill>
+                  <a:schemeClr val="tx1"/>
+                </a:solidFill>
+                <a:effectLst>
+                  <a:outerShdw blurRad="38100" dist="19050" dir="2700000" algn="tl" rotWithShape="0">
+                    <a:schemeClr val="dk1">
+                      <a:alpha val="40000"/>
+                    </a:schemeClr>
+                  </a:outerShdw>
+                </a:effectLst>
+              </a:rPr>
+              <a:t>3</a:t>
+            </a:r>
+            <a:endParaRPr lang="" altLang="en-US" b="1">
+              <a:solidFill>
+                <a:schemeClr val="tx1"/>
+              </a:solidFill>
+              <a:effectLst>
+                <a:outerShdw blurRad="38100" dist="19050" dir="2700000" algn="tl" rotWithShape="0">
+                  <a:schemeClr val="dk1">
+                    <a:alpha val="40000"/>
+                  </a:schemeClr>
+                </a:outerShdw>
+              </a:effectLst>
+            </a:endParaRPr>
+          </a:p>
+        </p:txBody>
+      </p:sp>
+      <p:sp>
+        <p:nvSpPr>
+          <p:cNvPr id="3" name="Rectangle 2"/>
+          <p:cNvSpPr/>
+          <p:nvPr/>
+        </p:nvSpPr>
+        <p:spPr>
+          <a:xfrm>
+            <a:off x="3261360" y="1558925"/>
+            <a:ext cx="3446780" cy="474345"/>
+          </a:xfrm>
+          <a:prstGeom prst="rect">
+            <a:avLst/>
+          </a:prstGeom>
+          <a:solidFill>
+            <a:schemeClr val="bg1"/>
+          </a:solidFill>
+          <a:ln w="12700">
+            <a:solidFill>
+              <a:schemeClr val="tx1"/>
+            </a:solidFill>
+          </a:ln>
+        </p:spPr>
+        <p:style>
+          <a:lnRef idx="2">
+            <a:schemeClr val="accent1">
+              <a:shade val="50000"/>
+            </a:schemeClr>
+          </a:lnRef>
+          <a:fillRef idx="1">
+            <a:schemeClr val="accent1"/>
+          </a:fillRef>
+          <a:effectRef idx="0">
+            <a:schemeClr val="accent1"/>
+          </a:effectRef>
+          <a:fontRef idx="minor">
+            <a:schemeClr val="lt1"/>
+          </a:fontRef>
+        </p:style>
+        <p:txBody>
+          <a:bodyPr rtlCol="0" anchor="ctr"/>
+          <a:p>
+            <a:pPr algn="ctr"/>
+            <a:r>
+              <a:rPr lang="" altLang="en-US" b="1">
+                <a:solidFill>
+                  <a:schemeClr val="accent5"/>
+                </a:solidFill>
+              </a:rPr>
+              <a:t>61</a:t>
+            </a:r>
+            <a:r>
+              <a:rPr lang="en-US" altLang="en-US" b="1">
+                <a:solidFill>
+                  <a:schemeClr val="accent5"/>
+                </a:solidFill>
+              </a:rPr>
+              <a:t> </a:t>
+            </a:r>
+            <a:r>
+              <a:rPr lang="" altLang="en-US" b="1">
+                <a:solidFill>
+                  <a:schemeClr val="accent5"/>
+                </a:solidFill>
+              </a:rPr>
+              <a:t>66</a:t>
+            </a:r>
+            <a:r>
+              <a:rPr lang="en-US" altLang="en-US" b="1">
+                <a:solidFill>
+                  <a:schemeClr val="accent5"/>
+                </a:solidFill>
+              </a:rPr>
+              <a:t> </a:t>
+            </a:r>
+            <a:r>
+              <a:rPr lang="" altLang="en-US" b="1">
+                <a:solidFill>
+                  <a:schemeClr val="accent5"/>
+                </a:solidFill>
+              </a:rPr>
+              <a:t>37</a:t>
+            </a:r>
+            <a:r>
+              <a:rPr lang="en-US" altLang="en-US" b="1">
+                <a:solidFill>
+                  <a:schemeClr val="accent5"/>
+                </a:solidFill>
+              </a:rPr>
+              <a:t> </a:t>
+            </a:r>
+            <a:r>
+              <a:rPr lang="" altLang="en-US" b="1">
+                <a:solidFill>
+                  <a:schemeClr val="accent5"/>
+                </a:solidFill>
+              </a:rPr>
+              <a:t>39</a:t>
+            </a:r>
+            <a:r>
+              <a:rPr lang="en-US" altLang="en-US" b="1">
+                <a:solidFill>
+                  <a:schemeClr val="accent5"/>
+                </a:solidFill>
+              </a:rPr>
+              <a:t> </a:t>
+            </a:r>
+            <a:r>
+              <a:rPr lang="" altLang="en-US" b="1">
+                <a:solidFill>
+                  <a:schemeClr val="accent5"/>
+                </a:solidFill>
+              </a:rPr>
+              <a:t>39</a:t>
+            </a:r>
+            <a:r>
+              <a:rPr lang="en-US" altLang="en-US" b="1">
+                <a:solidFill>
+                  <a:schemeClr val="accent5"/>
+                </a:solidFill>
+              </a:rPr>
+              <a:t> </a:t>
+            </a:r>
+            <a:r>
+              <a:rPr lang="" altLang="en-US" b="1">
+                <a:solidFill>
+                  <a:schemeClr val="accent5"/>
+                </a:solidFill>
+              </a:rPr>
+              <a:t>62</a:t>
+            </a:r>
+            <a:r>
+              <a:rPr lang="en-US" altLang="en-US" b="1">
+                <a:solidFill>
+                  <a:schemeClr val="accent5"/>
+                </a:solidFill>
+              </a:rPr>
+              <a:t> </a:t>
+            </a:r>
+            <a:r>
+              <a:rPr lang="" altLang="en-US" b="1">
+                <a:solidFill>
+                  <a:schemeClr val="accent5"/>
+                </a:solidFill>
+              </a:rPr>
+              <a:t>39</a:t>
+            </a:r>
+            <a:r>
+              <a:rPr lang="en-US" altLang="en-US" b="1">
+                <a:solidFill>
+                  <a:schemeClr val="accent5"/>
+                </a:solidFill>
+              </a:rPr>
+              <a:t> </a:t>
+            </a:r>
+            <a:r>
+              <a:rPr lang="" altLang="en-US" b="1">
+                <a:solidFill>
+                  <a:schemeClr val="accent5"/>
+                </a:solidFill>
+              </a:rPr>
+              <a:t>35</a:t>
+            </a:r>
+            <a:r>
+              <a:rPr lang="en-US" altLang="en-US" b="1">
+                <a:solidFill>
+                  <a:schemeClr val="accent5"/>
+                </a:solidFill>
+              </a:rPr>
+              <a:t> </a:t>
+            </a:r>
+            <a:endParaRPr lang="en-US" altLang="en-US" b="1">
+              <a:solidFill>
+                <a:schemeClr val="accent5"/>
+              </a:solidFill>
+            </a:endParaRPr>
+          </a:p>
+        </p:txBody>
+      </p:sp>
+      <p:sp>
+        <p:nvSpPr>
+          <p:cNvPr id="24" name="Rectangle 23"/>
+          <p:cNvSpPr/>
+          <p:nvPr/>
+        </p:nvSpPr>
+        <p:spPr>
+          <a:xfrm>
+            <a:off x="3261360" y="1084580"/>
+            <a:ext cx="3446780" cy="474345"/>
+          </a:xfrm>
+          <a:prstGeom prst="rect">
+            <a:avLst/>
+          </a:prstGeom>
+          <a:solidFill>
+            <a:schemeClr val="bg1"/>
+          </a:solidFill>
+          <a:ln w="12700">
+            <a:solidFill>
+              <a:schemeClr val="tx1"/>
+            </a:solidFill>
+          </a:ln>
+        </p:spPr>
+        <p:style>
+          <a:lnRef idx="2">
+            <a:schemeClr val="accent1">
+              <a:shade val="50000"/>
+            </a:schemeClr>
+          </a:lnRef>
+          <a:fillRef idx="1">
+            <a:schemeClr val="accent1"/>
+          </a:fillRef>
+          <a:effectRef idx="0">
+            <a:schemeClr val="accent1"/>
+          </a:effectRef>
+          <a:fontRef idx="minor">
+            <a:schemeClr val="lt1"/>
+          </a:fontRef>
+        </p:style>
+        <p:txBody>
+          <a:bodyPr rtlCol="0" anchor="ctr"/>
+          <a:p>
+            <a:pPr algn="ctr"/>
+            <a:r>
+              <a:rPr lang="en-US" altLang="en-US" b="1">
+                <a:solidFill>
+                  <a:schemeClr val="accent5"/>
+                </a:solidFill>
+              </a:rPr>
+              <a:t>00 00 00 00 </a:t>
+            </a:r>
+            <a:r>
+              <a:rPr lang="en-US" altLang="en-US" b="1">
+                <a:solidFill>
+                  <a:schemeClr val="accent5"/>
+                </a:solidFill>
+                <a:sym typeface="+mn-ea"/>
+              </a:rPr>
+              <a:t>00</a:t>
+            </a:r>
+            <a:r>
+              <a:rPr lang="en-US" altLang="en-US" b="1">
+                <a:solidFill>
+                  <a:schemeClr val="accent5"/>
+                </a:solidFill>
+              </a:rPr>
+              <a:t> </a:t>
+            </a:r>
+            <a:r>
+              <a:rPr lang="en-US" altLang="en-US" b="1">
+                <a:solidFill>
+                  <a:schemeClr val="accent5"/>
+                </a:solidFill>
+                <a:sym typeface="+mn-ea"/>
+              </a:rPr>
+              <a:t>00</a:t>
+            </a:r>
+            <a:r>
+              <a:rPr lang="en-US" altLang="en-US" b="1">
+                <a:solidFill>
+                  <a:schemeClr val="accent5"/>
+                </a:solidFill>
+              </a:rPr>
+              <a:t> </a:t>
+            </a:r>
+            <a:r>
+              <a:rPr lang="en-US" altLang="en-US" b="1">
+                <a:solidFill>
+                  <a:schemeClr val="accent5"/>
+                </a:solidFill>
+                <a:sym typeface="+mn-ea"/>
+              </a:rPr>
+              <a:t>00</a:t>
+            </a:r>
+            <a:r>
+              <a:rPr lang="" altLang="en-US" b="1">
+                <a:solidFill>
+                  <a:schemeClr val="accent5"/>
+                </a:solidFill>
+              </a:rPr>
+              <a:t> 00</a:t>
+            </a:r>
+            <a:r>
+              <a:rPr lang="en-US" altLang="en-US" b="1">
+                <a:solidFill>
+                  <a:schemeClr val="accent5"/>
+                </a:solidFill>
+              </a:rPr>
+              <a:t> </a:t>
+            </a:r>
+            <a:endParaRPr lang="en-US" altLang="en-US" b="1">
+              <a:solidFill>
+                <a:schemeClr val="accent5"/>
+              </a:solidFill>
+            </a:endParaRPr>
+          </a:p>
+        </p:txBody>
+      </p:sp>
+      <p:sp>
+        <p:nvSpPr>
+          <p:cNvPr id="25" name="Text Box 24"/>
+          <p:cNvSpPr txBox="true"/>
+          <p:nvPr/>
+        </p:nvSpPr>
+        <p:spPr>
+          <a:xfrm>
+            <a:off x="7275195" y="1611630"/>
+            <a:ext cx="4071620" cy="368300"/>
+          </a:xfrm>
+          <a:prstGeom prst="rect">
+            <a:avLst/>
+          </a:prstGeom>
+          <a:noFill/>
+        </p:spPr>
+        <p:txBody>
+          <a:bodyPr wrap="square" rtlCol="0">
+            <a:spAutoFit/>
+          </a:bodyPr>
+          <a:p>
+            <a:r>
+              <a:rPr lang="en-US" altLang="en-US"/>
+              <a:t>&lt;- rsp+4</a:t>
+            </a:r>
+            <a:r>
+              <a:rPr lang="" altLang="en-US"/>
+              <a:t>8</a:t>
+            </a:r>
+            <a:r>
+              <a:rPr lang="en-US" altLang="en-US"/>
+              <a:t>   0x5561dca</a:t>
+            </a:r>
+            <a:r>
+              <a:rPr lang="" altLang="en-US"/>
+              <a:t>8</a:t>
+            </a:r>
+            <a:endParaRPr lang="" altLang="en-US"/>
+          </a:p>
+        </p:txBody>
+      </p:sp>
+      <p:sp>
+        <p:nvSpPr>
+          <p:cNvPr id="26" name="Text Box 25"/>
+          <p:cNvSpPr txBox="true"/>
+          <p:nvPr/>
+        </p:nvSpPr>
+        <p:spPr>
+          <a:xfrm>
+            <a:off x="7275195" y="1137920"/>
+            <a:ext cx="4071620" cy="368300"/>
+          </a:xfrm>
+          <a:prstGeom prst="rect">
+            <a:avLst/>
+          </a:prstGeom>
+          <a:noFill/>
+        </p:spPr>
+        <p:txBody>
+          <a:bodyPr wrap="square" rtlCol="0">
+            <a:spAutoFit/>
+          </a:bodyPr>
+          <a:p>
+            <a:r>
+              <a:rPr lang="en-US" altLang="en-US"/>
+              <a:t>&lt;- rsp+</a:t>
+            </a:r>
+            <a:r>
+              <a:rPr lang="" altLang="en-US"/>
+              <a:t>56</a:t>
+            </a:r>
+            <a:r>
+              <a:rPr lang="en-US" altLang="en-US"/>
+              <a:t>   0x5561dc</a:t>
+            </a:r>
+            <a:r>
+              <a:rPr lang="" altLang="en-US"/>
+              <a:t>b</a:t>
+            </a:r>
+            <a:r>
+              <a:rPr lang="en-US" altLang="en-US"/>
+              <a:t>0</a:t>
+            </a:r>
+            <a:endParaRPr lang="en-US" altLang="en-US"/>
+          </a:p>
+        </p:txBody>
+      </p:sp>
+      <p:sp>
+        <p:nvSpPr>
+          <p:cNvPr id="27" name="Oval 26"/>
+          <p:cNvSpPr/>
+          <p:nvPr/>
+        </p:nvSpPr>
+        <p:spPr>
+          <a:xfrm>
+            <a:off x="2255520" y="1150620"/>
+            <a:ext cx="5256530" cy="948055"/>
+          </a:xfrm>
+          <a:prstGeom prst="ellipse">
+            <a:avLst/>
+          </a:prstGeom>
+          <a:noFill/>
+          <a:ln w="28575">
+            <a:solidFill>
+              <a:srgbClr val="7030A0"/>
+            </a:solidFill>
+            <a:prstDash val="dash"/>
+          </a:ln>
+          <a:extLst>
+            <a:ext uri="{909E8E84-426E-40DD-AFC4-6F175D3DCCD1}">
+              <a14:hiddenFill xmlns:a14="http://schemas.microsoft.com/office/drawing/2010/main">
+                <a:solidFill>
+                  <a:schemeClr val="accent2"/>
+                </a:solidFill>
+              </a14:hiddenFill>
+            </a:ext>
+          </a:extLst>
+        </p:spPr>
+        <p:style>
+          <a:lnRef idx="2">
+            <a:schemeClr val="accent1">
+              <a:shade val="50000"/>
+            </a:schemeClr>
+          </a:lnRef>
+          <a:fillRef idx="1">
+            <a:schemeClr val="accent1"/>
+          </a:fillRef>
+          <a:effectRef idx="0">
+            <a:schemeClr val="accent1"/>
+          </a:effectRef>
+          <a:fontRef idx="minor">
+            <a:schemeClr val="lt1"/>
+          </a:fontRef>
+        </p:style>
+        <p:txBody>
+          <a:bodyPr rtlCol="0" anchor="ctr"/>
+          <a:p>
+            <a:pPr algn="ctr"/>
+            <a:endParaRPr lang="en-US"/>
+          </a:p>
+        </p:txBody>
+      </p:sp>
+      <p:sp>
+        <p:nvSpPr>
+          <p:cNvPr id="28" name="Text Box 27"/>
+          <p:cNvSpPr txBox="true"/>
+          <p:nvPr/>
+        </p:nvSpPr>
+        <p:spPr>
+          <a:xfrm>
+            <a:off x="1390650" y="978535"/>
+            <a:ext cx="2494280" cy="368300"/>
+          </a:xfrm>
+          <a:prstGeom prst="rect">
+            <a:avLst/>
+          </a:prstGeom>
+          <a:noFill/>
+        </p:spPr>
+        <p:txBody>
+          <a:bodyPr wrap="square" rtlCol="0">
+            <a:spAutoFit/>
+          </a:bodyPr>
+          <a:p>
+            <a:r>
+              <a:rPr lang="" altLang="en-US" b="1">
+                <a:solidFill>
+                  <a:srgbClr val="7030A0"/>
+                </a:solidFill>
+              </a:rPr>
+              <a:t>cookie string</a:t>
+            </a:r>
+            <a:endParaRPr lang="" altLang="en-US" b="1">
+              <a:solidFill>
+                <a:srgbClr val="7030A0"/>
+              </a:solidFill>
+            </a:endParaRPr>
+          </a:p>
+        </p:txBody>
+      </p:sp>
+      <p:cxnSp>
+        <p:nvCxnSpPr>
+          <p:cNvPr id="29" name="Curved Connector 28"/>
+          <p:cNvCxnSpPr/>
+          <p:nvPr/>
+        </p:nvCxnSpPr>
+        <p:spPr>
+          <a:xfrm rot="10800000" flipH="true" flipV="true">
+            <a:off x="3261360" y="2270125"/>
+            <a:ext cx="3446780" cy="2318385"/>
+          </a:xfrm>
+          <a:prstGeom prst="curvedConnector5">
+            <a:avLst>
+              <a:gd name="adj1" fmla="val -6909"/>
+              <a:gd name="adj2" fmla="val 169734"/>
+              <a:gd name="adj3" fmla="val 106909"/>
+            </a:avLst>
+          </a:prstGeom>
+          <a:ln>
+            <a:solidFill>
+              <a:srgbClr val="FF0000"/>
+            </a:solidFill>
+            <a:tailEnd type="arrow"/>
+          </a:ln>
+        </p:spPr>
+        <p:style>
+          <a:lnRef idx="1">
+            <a:schemeClr val="accent1"/>
+          </a:lnRef>
+          <a:fillRef idx="0">
+            <a:schemeClr val="accent1"/>
+          </a:fillRef>
+          <a:effectRef idx="0">
+            <a:schemeClr val="accent1"/>
+          </a:effectRef>
+          <a:fontRef idx="minor">
+            <a:schemeClr val="tx1"/>
+          </a:fontRef>
+        </p:style>
+      </p:cxnSp>
+      <p:sp>
+        <p:nvSpPr>
+          <p:cNvPr id="30" name="Rectangle 29"/>
+          <p:cNvSpPr/>
+          <p:nvPr/>
+        </p:nvSpPr>
+        <p:spPr>
+          <a:xfrm>
+            <a:off x="7252335" y="449580"/>
+            <a:ext cx="1746250" cy="589915"/>
+          </a:xfrm>
+          <a:prstGeom prst="rect">
+            <a:avLst/>
+          </a:prstGeom>
+        </p:spPr>
+        <p:style>
+          <a:lnRef idx="2">
+            <a:schemeClr val="accent1">
+              <a:shade val="50000"/>
+            </a:schemeClr>
+          </a:lnRef>
+          <a:fillRef idx="1">
+            <a:schemeClr val="accent1"/>
+          </a:fillRef>
+          <a:effectRef idx="0">
+            <a:schemeClr val="accent1"/>
+          </a:effectRef>
+          <a:fontRef idx="minor">
+            <a:schemeClr val="lt1"/>
+          </a:fontRef>
+        </p:style>
+        <p:txBody>
+          <a:bodyPr rtlCol="0" anchor="ctr"/>
+          <a:p>
+            <a:pPr algn="ctr"/>
+            <a:r>
+              <a:rPr lang="en-US" altLang="en-US"/>
+              <a:t>touch</a:t>
+            </a:r>
+            <a:r>
+              <a:rPr lang="" altLang="en-US"/>
+              <a:t>3</a:t>
+            </a:r>
+            <a:r>
+              <a:rPr lang="en-US" altLang="en-US"/>
+              <a:t>()</a:t>
+            </a:r>
+            <a:endParaRPr lang="en-US" altLang="en-US"/>
+          </a:p>
+        </p:txBody>
+      </p:sp>
+      <p:cxnSp>
+        <p:nvCxnSpPr>
+          <p:cNvPr id="31" name="Curved Connector 30"/>
+          <p:cNvCxnSpPr>
+            <a:endCxn id="30" idx="1"/>
+          </p:cNvCxnSpPr>
+          <p:nvPr/>
+        </p:nvCxnSpPr>
+        <p:spPr>
+          <a:xfrm rot="16200000">
+            <a:off x="4551680" y="1177290"/>
+            <a:ext cx="3132455" cy="2267585"/>
+          </a:xfrm>
+          <a:prstGeom prst="curvedConnector2">
+            <a:avLst/>
+          </a:prstGeom>
+          <a:ln>
+            <a:solidFill>
+              <a:srgbClr val="FF0000"/>
+            </a:solidFill>
+            <a:tailEnd type="arrow"/>
+          </a:ln>
+        </p:spPr>
+        <p:style>
+          <a:lnRef idx="1">
+            <a:schemeClr val="accent1"/>
+          </a:lnRef>
+          <a:fillRef idx="0">
+            <a:schemeClr val="accent1"/>
+          </a:fillRef>
+          <a:effectRef idx="0">
+            <a:schemeClr val="accent1"/>
+          </a:effectRef>
+          <a:fontRef idx="minor">
+            <a:schemeClr val="tx1"/>
+          </a:fontRef>
+        </p:style>
+      </p:cxnSp>
     </p:spTree>
   </p:cSld>
   <p:clrMapOvr>

</xml_diff>